<commit_message>
removed UL and added UBICS to affiliations
</commit_message>
<xml_diff>
--- a/cogsci.pptx
+++ b/cogsci.pptx
@@ -2971,60 +2971,6 @@
           <a:chExt cx="0" cy="0"/>
         </a:xfrm>
       </p:grpSpPr>
-      <p:sp>
-        <p:nvSpPr>
-          <p:cNvPr id="37" name="Rectangle 36">
-            <a:extLst>
-              <a:ext uri="{FF2B5EF4-FFF2-40B4-BE49-F238E27FC236}">
-                <a16:creationId xmlns:a16="http://schemas.microsoft.com/office/drawing/2014/main" id="{173EA079-A0E2-8048-8869-2642DB616FE4}"/>
-              </a:ext>
-            </a:extLst>
-          </p:cNvPr>
-          <p:cNvSpPr/>
-          <p:nvPr/>
-        </p:nvSpPr>
-        <p:spPr>
-          <a:xfrm>
-            <a:off x="1" y="5594210"/>
-            <a:ext cx="12800932" cy="4006990"/>
-          </a:xfrm>
-          <a:prstGeom prst="rect">
-            <a:avLst/>
-          </a:prstGeom>
-          <a:solidFill>
-            <a:srgbClr val="C00000">
-              <a:alpha val="6000"/>
-            </a:srgbClr>
-          </a:solidFill>
-          <a:ln>
-            <a:noFill/>
-          </a:ln>
-        </p:spPr>
-        <p:style>
-          <a:lnRef idx="2">
-            <a:schemeClr val="accent1">
-              <a:shade val="50000"/>
-            </a:schemeClr>
-          </a:lnRef>
-          <a:fillRef idx="1">
-            <a:schemeClr val="accent1"/>
-          </a:fillRef>
-          <a:effectRef idx="0">
-            <a:schemeClr val="accent1"/>
-          </a:effectRef>
-          <a:fontRef idx="minor">
-            <a:schemeClr val="lt1"/>
-          </a:fontRef>
-        </p:style>
-        <p:txBody>
-          <a:bodyPr rtlCol="0" anchor="ctr"/>
-          <a:lstStyle/>
-          <a:p>
-            <a:pPr algn="ctr"/>
-            <a:endParaRPr lang="en-ES" dirty="0"/>
-          </a:p>
-        </p:txBody>
-      </p:sp>
       <p:pic>
         <p:nvPicPr>
           <p:cNvPr id="10" name="Picture 9" descr="Chart, box and whisker chart&#10;&#10;Description automatically generated">
@@ -3237,62 +3183,71 @@
                 <a:ea typeface="Helvetica Neue" panose="02000503000000020004" pitchFamily="2" charset="0"/>
                 <a:cs typeface="Helvetica Neue" panose="02000503000000020004" pitchFamily="2" charset="0"/>
               </a:rPr>
+              <a:t>1,2</a:t>
+            </a:r>
+            <a:r>
+              <a:rPr lang="en-ES" sz="2400" dirty="0">
+                <a:latin typeface="Helvetica Neue" panose="02000503000000020004" pitchFamily="2" charset="0"/>
+                <a:ea typeface="Helvetica Neue" panose="02000503000000020004" pitchFamily="2" charset="0"/>
+                <a:cs typeface="Helvetica Neue" panose="02000503000000020004" pitchFamily="2" charset="0"/>
+              </a:rPr>
+              <a:t>*, Pedro Tiago Martins</a:t>
+            </a:r>
+            <a:r>
+              <a:rPr lang="en-ES" sz="2400" baseline="30000" dirty="0">
+                <a:latin typeface="Helvetica Neue" panose="02000503000000020004" pitchFamily="2" charset="0"/>
+                <a:ea typeface="Helvetica Neue" panose="02000503000000020004" pitchFamily="2" charset="0"/>
+                <a:cs typeface="Helvetica Neue" panose="02000503000000020004" pitchFamily="2" charset="0"/>
+              </a:rPr>
+              <a:t>1,2</a:t>
+            </a:r>
+            <a:r>
+              <a:rPr lang="en-ES" sz="2400" dirty="0">
+                <a:latin typeface="Helvetica Neue" panose="02000503000000020004" pitchFamily="2" charset="0"/>
+                <a:ea typeface="Helvetica Neue" panose="02000503000000020004" pitchFamily="2" charset="0"/>
+                <a:cs typeface="Helvetica Neue" panose="02000503000000020004" pitchFamily="2" charset="0"/>
+              </a:rPr>
+              <a:t>, Alejandro Andirkó</a:t>
+            </a:r>
+            <a:r>
+              <a:rPr lang="en-ES" sz="2400" baseline="30000" dirty="0">
+                <a:latin typeface="Helvetica Neue" panose="02000503000000020004" pitchFamily="2" charset="0"/>
+                <a:ea typeface="Helvetica Neue" panose="02000503000000020004" pitchFamily="2" charset="0"/>
+                <a:cs typeface="Helvetica Neue" panose="02000503000000020004" pitchFamily="2" charset="0"/>
+              </a:rPr>
+              <a:t>1,2</a:t>
+            </a:r>
+            <a:endParaRPr lang="en-ES" sz="2400" dirty="0">
+              <a:latin typeface="Helvetica Neue" panose="02000503000000020004" pitchFamily="2" charset="0"/>
+              <a:ea typeface="Helvetica Neue" panose="02000503000000020004" pitchFamily="2" charset="0"/>
+              <a:cs typeface="Helvetica Neue" panose="02000503000000020004" pitchFamily="2" charset="0"/>
+            </a:endParaRPr>
+          </a:p>
+          <a:p>
+            <a:pPr algn="ctr"/>
+            <a:r>
+              <a:rPr lang="en-ES" sz="1600" baseline="30000" dirty="0">
+                <a:latin typeface="Helvetica Neue" panose="02000503000000020004" pitchFamily="2" charset="0"/>
+                <a:ea typeface="Helvetica Neue" panose="02000503000000020004" pitchFamily="2" charset="0"/>
+                <a:cs typeface="Helvetica Neue" panose="02000503000000020004" pitchFamily="2" charset="0"/>
+              </a:rPr>
               <a:t>1</a:t>
             </a:r>
             <a:r>
-              <a:rPr lang="en-ES" dirty="0"/>
-              <a:t>✉</a:t>
-            </a:r>
-            <a:r>
-              <a:rPr lang="en-ES" sz="2400" dirty="0">
-                <a:latin typeface="Helvetica Neue" panose="02000503000000020004" pitchFamily="2" charset="0"/>
-                <a:ea typeface="Helvetica Neue" panose="02000503000000020004" pitchFamily="2" charset="0"/>
-                <a:cs typeface="Helvetica Neue" panose="02000503000000020004" pitchFamily="2" charset="0"/>
-              </a:rPr>
-              <a:t>, Pedro Tiago Martins</a:t>
-            </a:r>
-            <a:r>
-              <a:rPr lang="en-ES" sz="2400" baseline="30000" dirty="0">
-                <a:latin typeface="Helvetica Neue" panose="02000503000000020004" pitchFamily="2" charset="0"/>
-                <a:ea typeface="Helvetica Neue" panose="02000503000000020004" pitchFamily="2" charset="0"/>
-                <a:cs typeface="Helvetica Neue" panose="02000503000000020004" pitchFamily="2" charset="0"/>
-              </a:rPr>
-              <a:t>1,2</a:t>
-            </a:r>
-            <a:r>
-              <a:rPr lang="en-ES" sz="2400" dirty="0">
-                <a:latin typeface="Helvetica Neue" panose="02000503000000020004" pitchFamily="2" charset="0"/>
-                <a:ea typeface="Helvetica Neue" panose="02000503000000020004" pitchFamily="2" charset="0"/>
-                <a:cs typeface="Helvetica Neue" panose="02000503000000020004" pitchFamily="2" charset="0"/>
-              </a:rPr>
-              <a:t>, Alejandro Andirkó</a:t>
-            </a:r>
-            <a:r>
-              <a:rPr lang="en-ES" sz="2400" baseline="30000" dirty="0">
-                <a:latin typeface="Helvetica Neue" panose="02000503000000020004" pitchFamily="2" charset="0"/>
-                <a:ea typeface="Helvetica Neue" panose="02000503000000020004" pitchFamily="2" charset="0"/>
-                <a:cs typeface="Helvetica Neue" panose="02000503000000020004" pitchFamily="2" charset="0"/>
-              </a:rPr>
-              <a:t>1</a:t>
-            </a:r>
-            <a:r>
-              <a:rPr lang="en-ES" sz="2400" dirty="0">
-                <a:latin typeface="Helvetica Neue" panose="02000503000000020004" pitchFamily="2" charset="0"/>
-                <a:ea typeface="Helvetica Neue" panose="02000503000000020004" pitchFamily="2" charset="0"/>
-                <a:cs typeface="Helvetica Neue" panose="02000503000000020004" pitchFamily="2" charset="0"/>
-              </a:rPr>
-              <a:t>*</a:t>
-            </a:r>
-          </a:p>
-          <a:p>
-            <a:pPr algn="ctr"/>
+              <a:rPr lang="en-ES" sz="1600" dirty="0">
+                <a:latin typeface="Helvetica Neue" panose="02000503000000020004" pitchFamily="2" charset="0"/>
+                <a:ea typeface="Helvetica Neue" panose="02000503000000020004" pitchFamily="2" charset="0"/>
+                <a:cs typeface="Helvetica Neue" panose="02000503000000020004" pitchFamily="2" charset="0"/>
+              </a:rPr>
+              <a:t>University of Barcelona, </a:t>
+            </a:r>
             <a:r>
               <a:rPr lang="en-ES" sz="1600" baseline="30000" dirty="0">
                 <a:latin typeface="Helvetica Neue" panose="02000503000000020004" pitchFamily="2" charset="0"/>
                 <a:ea typeface="Helvetica Neue" panose="02000503000000020004" pitchFamily="2" charset="0"/>
                 <a:cs typeface="Helvetica Neue" panose="02000503000000020004" pitchFamily="2" charset="0"/>
               </a:rPr>
-              <a:t>1</a:t>
+              <a:t>2</a:t>
             </a:r>
             <a:r>
               <a:rPr lang="en-ES" sz="1600" dirty="0">
@@ -3300,41 +3255,13 @@
                 <a:ea typeface="Helvetica Neue" panose="02000503000000020004" pitchFamily="2" charset="0"/>
                 <a:cs typeface="Helvetica Neue" panose="02000503000000020004" pitchFamily="2" charset="0"/>
               </a:rPr>
-              <a:t>University of Barcelona, </a:t>
-            </a:r>
-            <a:r>
-              <a:rPr lang="en-ES" sz="1600" baseline="30000" dirty="0">
-                <a:latin typeface="Helvetica Neue" panose="02000503000000020004" pitchFamily="2" charset="0"/>
-                <a:ea typeface="Helvetica Neue" panose="02000503000000020004" pitchFamily="2" charset="0"/>
-                <a:cs typeface="Helvetica Neue" panose="02000503000000020004" pitchFamily="2" charset="0"/>
-              </a:rPr>
-              <a:t>2</a:t>
-            </a:r>
-            <a:r>
-              <a:rPr lang="en-ES" sz="1600" dirty="0">
-                <a:latin typeface="Helvetica Neue" panose="02000503000000020004" pitchFamily="2" charset="0"/>
-                <a:ea typeface="Helvetica Neue" panose="02000503000000020004" pitchFamily="2" charset="0"/>
-                <a:cs typeface="Helvetica Neue" panose="02000503000000020004" pitchFamily="2" charset="0"/>
-              </a:rPr>
-              <a:t>University of Ljubljana,</a:t>
+              <a:t>UBICS,</a:t>
             </a:r>
             <a:r>
               <a:rPr lang="en-ES" sz="1600" dirty="0">
                 <a:latin typeface="Helvetica Neue" panose="020B0604020202020204" charset="0"/>
               </a:rPr>
-              <a:t> </a:t>
-            </a:r>
-            <a:r>
-              <a:rPr lang="en-ES" sz="1600" baseline="30000" dirty="0">
-                <a:latin typeface="Helvetica Neue" panose="020B0604020202020204" charset="0"/>
-              </a:rPr>
-              <a:t>✉</a:t>
-            </a:r>
-            <a:r>
-              <a:rPr lang="en-ES" sz="1600" dirty="0">
-                <a:latin typeface="Helvetica Neue" panose="020B0604020202020204" charset="0"/>
-              </a:rPr>
-              <a:t> </a:t>
+              <a:t> *</a:t>
             </a:r>
             <a:r>
               <a:rPr lang="en-ES" sz="1600" dirty="0">
@@ -6314,6 +6241,60 @@
               </a:rPr>
               <a:t>h</a:t>
             </a:r>
+          </a:p>
+        </p:txBody>
+      </p:sp>
+      <p:sp>
+        <p:nvSpPr>
+          <p:cNvPr id="37" name="Rectangle 36">
+            <a:extLst>
+              <a:ext uri="{FF2B5EF4-FFF2-40B4-BE49-F238E27FC236}">
+                <a16:creationId xmlns:a16="http://schemas.microsoft.com/office/drawing/2014/main" id="{173EA079-A0E2-8048-8869-2642DB616FE4}"/>
+              </a:ext>
+            </a:extLst>
+          </p:cNvPr>
+          <p:cNvSpPr/>
+          <p:nvPr/>
+        </p:nvSpPr>
+        <p:spPr>
+          <a:xfrm>
+            <a:off x="1" y="5594210"/>
+            <a:ext cx="12800932" cy="4006990"/>
+          </a:xfrm>
+          <a:prstGeom prst="rect">
+            <a:avLst/>
+          </a:prstGeom>
+          <a:solidFill>
+            <a:srgbClr val="C00000">
+              <a:alpha val="6000"/>
+            </a:srgbClr>
+          </a:solidFill>
+          <a:ln>
+            <a:noFill/>
+          </a:ln>
+        </p:spPr>
+        <p:style>
+          <a:lnRef idx="2">
+            <a:schemeClr val="accent1">
+              <a:shade val="50000"/>
+            </a:schemeClr>
+          </a:lnRef>
+          <a:fillRef idx="1">
+            <a:schemeClr val="accent1"/>
+          </a:fillRef>
+          <a:effectRef idx="0">
+            <a:schemeClr val="accent1"/>
+          </a:effectRef>
+          <a:fontRef idx="minor">
+            <a:schemeClr val="lt1"/>
+          </a:fontRef>
+        </p:style>
+        <p:txBody>
+          <a:bodyPr rtlCol="0" anchor="ctr"/>
+          <a:lstStyle/>
+          <a:p>
+            <a:pPr algn="ctr"/>
+            <a:endParaRPr lang="en-ES" dirty="0"/>
           </a:p>
         </p:txBody>
       </p:sp>

</xml_diff>